<commit_message>
5 and 6 cleanup
</commit_message>
<xml_diff>
--- a/instructor/l06/l06-pad.pptx
+++ b/instructor/l06/l06-pad.pptx
@@ -251,7 +251,7 @@
           <a:p>
             <a:fld id="{DFEE7296-98E2-144D-9918-2661B681BC93}" type="datetimeFigureOut">
               <a:rPr lang="en-US" smtClean="0"/>
-              <a:t>1/26/23</a:t>
+              <a:t>9/25/23</a:t>
             </a:fld>
             <a:endParaRPr lang="en-US"/>
           </a:p>
@@ -421,7 +421,7 @@
           <a:p>
             <a:fld id="{DFEE7296-98E2-144D-9918-2661B681BC93}" type="datetimeFigureOut">
               <a:rPr lang="en-US" smtClean="0"/>
-              <a:t>1/26/23</a:t>
+              <a:t>9/25/23</a:t>
             </a:fld>
             <a:endParaRPr lang="en-US"/>
           </a:p>
@@ -601,7 +601,7 @@
           <a:p>
             <a:fld id="{DFEE7296-98E2-144D-9918-2661B681BC93}" type="datetimeFigureOut">
               <a:rPr lang="en-US" smtClean="0"/>
-              <a:t>1/26/23</a:t>
+              <a:t>9/25/23</a:t>
             </a:fld>
             <a:endParaRPr lang="en-US"/>
           </a:p>
@@ -771,7 +771,7 @@
           <a:p>
             <a:fld id="{DFEE7296-98E2-144D-9918-2661B681BC93}" type="datetimeFigureOut">
               <a:rPr lang="en-US" smtClean="0"/>
-              <a:t>1/26/23</a:t>
+              <a:t>9/25/23</a:t>
             </a:fld>
             <a:endParaRPr lang="en-US"/>
           </a:p>
@@ -1015,7 +1015,7 @@
           <a:p>
             <a:fld id="{DFEE7296-98E2-144D-9918-2661B681BC93}" type="datetimeFigureOut">
               <a:rPr lang="en-US" smtClean="0"/>
-              <a:t>1/26/23</a:t>
+              <a:t>9/25/23</a:t>
             </a:fld>
             <a:endParaRPr lang="en-US"/>
           </a:p>
@@ -1247,7 +1247,7 @@
           <a:p>
             <a:fld id="{DFEE7296-98E2-144D-9918-2661B681BC93}" type="datetimeFigureOut">
               <a:rPr lang="en-US" smtClean="0"/>
-              <a:t>1/26/23</a:t>
+              <a:t>9/25/23</a:t>
             </a:fld>
             <a:endParaRPr lang="en-US"/>
           </a:p>
@@ -1614,7 +1614,7 @@
           <a:p>
             <a:fld id="{DFEE7296-98E2-144D-9918-2661B681BC93}" type="datetimeFigureOut">
               <a:rPr lang="en-US" smtClean="0"/>
-              <a:t>1/26/23</a:t>
+              <a:t>9/25/23</a:t>
             </a:fld>
             <a:endParaRPr lang="en-US"/>
           </a:p>
@@ -1732,7 +1732,7 @@
           <a:p>
             <a:fld id="{DFEE7296-98E2-144D-9918-2661B681BC93}" type="datetimeFigureOut">
               <a:rPr lang="en-US" smtClean="0"/>
-              <a:t>1/26/23</a:t>
+              <a:t>9/25/23</a:t>
             </a:fld>
             <a:endParaRPr lang="en-US"/>
           </a:p>
@@ -1827,7 +1827,7 @@
           <a:p>
             <a:fld id="{DFEE7296-98E2-144D-9918-2661B681BC93}" type="datetimeFigureOut">
               <a:rPr lang="en-US" smtClean="0"/>
-              <a:t>1/26/23</a:t>
+              <a:t>9/25/23</a:t>
             </a:fld>
             <a:endParaRPr lang="en-US"/>
           </a:p>
@@ -2104,7 +2104,7 @@
           <a:p>
             <a:fld id="{DFEE7296-98E2-144D-9918-2661B681BC93}" type="datetimeFigureOut">
               <a:rPr lang="en-US" smtClean="0"/>
-              <a:t>1/26/23</a:t>
+              <a:t>9/25/23</a:t>
             </a:fld>
             <a:endParaRPr lang="en-US"/>
           </a:p>
@@ -2361,7 +2361,7 @@
           <a:p>
             <a:fld id="{DFEE7296-98E2-144D-9918-2661B681BC93}" type="datetimeFigureOut">
               <a:rPr lang="en-US" smtClean="0"/>
-              <a:t>1/26/23</a:t>
+              <a:t>9/25/23</a:t>
             </a:fld>
             <a:endParaRPr lang="en-US"/>
           </a:p>
@@ -2574,7 +2574,7 @@
           <a:p>
             <a:fld id="{DFEE7296-98E2-144D-9918-2661B681BC93}" type="datetimeFigureOut">
               <a:rPr lang="en-US" smtClean="0"/>
-              <a:t>1/26/23</a:t>
+              <a:t>9/25/23</a:t>
             </a:fld>
             <a:endParaRPr lang="en-US"/>
           </a:p>
@@ -3032,7 +3032,7 @@
           <a:p>
             <a:r>
               <a:rPr lang="en-US" dirty="0"/>
-              <a:t>I know that the detailed instructions matter, and I will read them this weekend</a:t>
+              <a:t>I know that the detailed instructions matter, and I will read them this week.</a:t>
             </a:r>
           </a:p>
           <a:p>
@@ -3064,14 +3064,10 @@
           <a:p>
             <a:r>
               <a:rPr lang="en-US" dirty="0"/>
-              <a:t>I know that if I don’t follow a problem statement carefully I will lose many </a:t>
-            </a:r>
-            <a:r>
-              <a:rPr lang="en-US"/>
-              <a:t>points.</a:t>
+              <a:t>I know that if I don’t follow a problem statement carefully I will lose many points.</a:t>
             </a:r>
             <a:br>
-              <a:rPr lang="en-US"/>
+              <a:rPr lang="en-US" dirty="0"/>
             </a:br>
             <a:endParaRPr lang="en-US" dirty="0"/>
           </a:p>
@@ -3100,7 +3096,7 @@
             </a:r>
             <a:r>
               <a:rPr lang="en-US" dirty="0"/>
-              <a:t> read the instructions, not going to pay attention to the details, my grade is what it is</a:t>
+              <a:t> read the instructions, not going to pay attention to the details, my grade will be what it will be</a:t>
             </a:r>
           </a:p>
         </p:txBody>
@@ -3874,8 +3870,8 @@
         </p:nvSpPr>
         <p:spPr>
           <a:xfrm>
-            <a:off x="282102" y="1044926"/>
-            <a:ext cx="8414426" cy="1815882"/>
+            <a:off x="282102" y="822811"/>
+            <a:ext cx="8861898" cy="1569660"/>
           </a:xfrm>
           <a:prstGeom prst="rect">
             <a:avLst/>
@@ -3889,32 +3885,55 @@
           <a:lstStyle/>
           <a:p>
             <a:r>
-              <a:rPr lang="en-US" sz="2800" dirty="0">
+              <a:rPr lang="en-US" sz="2400" dirty="0">
                 <a:solidFill>
                   <a:srgbClr val="FF0000"/>
                 </a:solidFill>
               </a:rPr>
-              <a:t>result of natural recursion will be correct “if and only if” 	correct base case result </a:t>
-            </a:r>
-          </a:p>
-          <a:p>
-            <a:r>
-              <a:rPr lang="en-US" sz="2800" dirty="0">
+              <a:t>result of natural recursion (RNR) will be correct </a:t>
+            </a:r>
+            <a:r>
+              <a:rPr lang="en-US" sz="2400" u="sng" dirty="0">
                 <a:solidFill>
                   <a:srgbClr val="FF0000"/>
                 </a:solidFill>
               </a:rPr>
-              <a:t>	correct contribution of first</a:t>
-            </a:r>
-          </a:p>
-          <a:p>
-            <a:r>
-              <a:rPr lang="en-US" sz="2800" dirty="0">
+              <a:t>if and only if </a:t>
+            </a:r>
+            <a:endParaRPr lang="en-US" sz="2400" dirty="0">
+              <a:solidFill>
+                <a:srgbClr val="FF0000"/>
+              </a:solidFill>
+            </a:endParaRPr>
+          </a:p>
+          <a:p>
+            <a:r>
+              <a:rPr lang="en-US" sz="2400" dirty="0">
                 <a:solidFill>
                   <a:srgbClr val="FF0000"/>
                 </a:solidFill>
               </a:rPr>
-              <a:t>      correct combination of contribution and RNR</a:t>
+              <a:t>  - correct base case result </a:t>
+            </a:r>
+          </a:p>
+          <a:p>
+            <a:r>
+              <a:rPr lang="en-US" sz="2400" dirty="0">
+                <a:solidFill>
+                  <a:srgbClr val="FF0000"/>
+                </a:solidFill>
+              </a:rPr>
+              <a:t>  - correct contribution of first</a:t>
+            </a:r>
+          </a:p>
+          <a:p>
+            <a:r>
+              <a:rPr lang="en-US" sz="2400" dirty="0">
+                <a:solidFill>
+                  <a:srgbClr val="FF0000"/>
+                </a:solidFill>
+              </a:rPr>
+              <a:t>  - correct combination of contribution and RNR</a:t>
             </a:r>
           </a:p>
         </p:txBody>

</xml_diff>